<commit_message>
Aktuellste Folien Tag 5
</commit_message>
<xml_diff>
--- a/4. Flexbox&Grid/Flexbox&Grid.pptx
+++ b/4. Flexbox&Grid/Flexbox&Grid.pptx
@@ -33,7 +33,8 @@
     <p:sldId id="369" r:id="rId27"/>
     <p:sldId id="371" r:id="rId28"/>
     <p:sldId id="372" r:id="rId29"/>
-    <p:sldId id="292" r:id="rId30"/>
+    <p:sldId id="373" r:id="rId30"/>
+    <p:sldId id="292" r:id="rId31"/>
   </p:sldIdLst>
   <p:sldSz cx="12192000" cy="6858000"/>
   <p:notesSz cx="6858000" cy="9144000"/>
@@ -3500,7 +3501,7 @@
                 <a16:creationId xmlns:a16="http://schemas.microsoft.com/office/drawing/2014/main" id="{BE229233-9672-4675-99B7-6CBCEF1CD415}"/>
               </a:ext>
               <a:ext uri="{C183D7F6-B498-43B3-948B-1728B52AA6E4}">
-                <adec:decorative xmlns="" xmlns:adec="http://schemas.microsoft.com/office/drawing/2017/decorative" val="1"/>
+                <adec:decorative xmlns:adec="http://schemas.microsoft.com/office/drawing/2017/decorative" xmlns="" val="1"/>
               </a:ext>
             </a:extLst>
           </p:cNvPr>
@@ -3595,7 +3596,7 @@
                 <a16:creationId xmlns:a16="http://schemas.microsoft.com/office/drawing/2014/main" id="{EC5FF010-B53C-46BE-BEEF-AF926A00F67F}"/>
               </a:ext>
               <a:ext uri="{C183D7F6-B498-43B3-948B-1728B52AA6E4}">
-                <adec:decorative xmlns="" xmlns:adec="http://schemas.microsoft.com/office/drawing/2017/decorative" val="1"/>
+                <adec:decorative xmlns:adec="http://schemas.microsoft.com/office/drawing/2017/decorative" xmlns="" val="1"/>
               </a:ext>
             </a:extLst>
           </p:cNvPr>
@@ -3661,7 +3662,7 @@
                 <a16:creationId xmlns:a16="http://schemas.microsoft.com/office/drawing/2014/main" id="{8509AD9C-1F43-4138-A72B-8CA988EDD475}"/>
               </a:ext>
               <a:ext uri="{C183D7F6-B498-43B3-948B-1728B52AA6E4}">
-                <adec:decorative xmlns="" xmlns:adec="http://schemas.microsoft.com/office/drawing/2017/decorative" val="1"/>
+                <adec:decorative xmlns:adec="http://schemas.microsoft.com/office/drawing/2017/decorative" xmlns="" val="1"/>
               </a:ext>
             </a:extLst>
           </p:cNvPr>
@@ -3824,6 +3825,13 @@
   <p:clrMapOvr>
     <a:masterClrMapping/>
   </p:clrMapOvr>
+  <p:timing>
+    <p:tnLst>
+      <p:par>
+        <p:cTn id="1" dur="indefinite" restart="never" nodeType="tmRoot"/>
+      </p:par>
+    </p:tnLst>
+  </p:timing>
 </p:sld>
 </file>
 
@@ -12927,88 +12935,94 @@
       </p:grpSpPr>
       <p:sp>
         <p:nvSpPr>
-          <p:cNvPr id="6" name="Titel 5">
-            <a:extLst>
-              <a:ext uri="{FF2B5EF4-FFF2-40B4-BE49-F238E27FC236}">
-                <a16:creationId xmlns:a16="http://schemas.microsoft.com/office/drawing/2014/main" id="{215C6C17-3994-268F-CD9B-1F627A31A4B8}"/>
-              </a:ext>
-            </a:extLst>
-          </p:cNvPr>
+          <p:cNvPr id="2" name="Titel 1"/>
           <p:cNvSpPr>
             <a:spLocks noGrp="1"/>
           </p:cNvSpPr>
           <p:nvPr>
-            <p:ph type="ctrTitle"/>
+            <p:ph type="title"/>
           </p:nvPr>
         </p:nvSpPr>
-        <p:spPr>
-          <a:xfrm>
-            <a:off x="2032213" y="370652"/>
-            <a:ext cx="8127574" cy="2736443"/>
-          </a:xfrm>
-        </p:spPr>
+        <p:spPr/>
         <p:txBody>
           <a:bodyPr/>
           <a:lstStyle/>
           <a:p>
             <a:r>
-              <a:rPr lang="de-AT" dirty="0"/>
-              <a:t>Viel Erfolg beim Entwickeln!</a:t>
-            </a:r>
+              <a:rPr lang="de-AT" dirty="0" smtClean="0"/>
+              <a:t>CSS </a:t>
+            </a:r>
+            <a:r>
+              <a:rPr lang="de-AT" dirty="0" err="1" smtClean="0"/>
+              <a:t>Grid</a:t>
+            </a:r>
+            <a:r>
+              <a:rPr lang="de-AT" dirty="0" smtClean="0"/>
+              <a:t> Übung Schachbrett</a:t>
+            </a:r>
+            <a:endParaRPr lang="en-US" dirty="0"/>
+          </a:p>
+        </p:txBody>
+      </p:sp>
+      <p:sp>
+        <p:nvSpPr>
+          <p:cNvPr id="3" name="Inhaltsplatzhalter 2"/>
+          <p:cNvSpPr>
+            <a:spLocks noGrp="1"/>
+          </p:cNvSpPr>
+          <p:nvPr>
+            <p:ph idx="1"/>
+          </p:nvPr>
+        </p:nvSpPr>
+        <p:spPr/>
+        <p:txBody>
+          <a:bodyPr/>
+          <a:lstStyle/>
+          <a:p>
+            <a:r>
+              <a:rPr lang="de-AT" dirty="0" smtClean="0"/>
+              <a:t>Ressourcen: CSS/Schachbrett</a:t>
+            </a:r>
+          </a:p>
+          <a:p>
+            <a:r>
+              <a:rPr lang="de-AT" dirty="0" smtClean="0"/>
+              <a:t>Schreibe CSS Code um ein Schachbrett erscheinen zu lassen</a:t>
+            </a:r>
+          </a:p>
+          <a:p>
+            <a:endParaRPr lang="en-US" dirty="0"/>
           </a:p>
         </p:txBody>
       </p:sp>
       <p:pic>
         <p:nvPicPr>
-          <p:cNvPr id="2050" name="Picture 2" descr="CODERS.BAY | Linz">
-            <a:extLst>
-              <a:ext uri="{FF2B5EF4-FFF2-40B4-BE49-F238E27FC236}">
-                <a16:creationId xmlns:a16="http://schemas.microsoft.com/office/drawing/2014/main" id="{FC92A2D7-CD40-5160-E3FA-7A115A1ECE63}"/>
-              </a:ext>
-            </a:extLst>
-          </p:cNvPr>
+          <p:cNvPr id="4" name="Grafik 3"/>
           <p:cNvPicPr>
-            <a:picLocks noChangeAspect="1" noChangeArrowheads="1"/>
+            <a:picLocks noChangeAspect="1"/>
           </p:cNvPicPr>
           <p:nvPr/>
         </p:nvPicPr>
         <p:blipFill>
-          <a:blip r:embed="rId2">
-            <a:extLst>
-              <a:ext uri="{28A0092B-C50C-407E-A947-70E740481C1C}">
-                <a14:useLocalDpi xmlns:a14="http://schemas.microsoft.com/office/drawing/2010/main" val="0"/>
-              </a:ext>
-            </a:extLst>
-          </a:blip>
-          <a:srcRect/>
+          <a:blip r:embed="rId2"/>
           <a:stretch>
             <a:fillRect/>
           </a:stretch>
         </p:blipFill>
-        <p:spPr bwMode="auto">
+        <p:spPr>
           <a:xfrm>
-            <a:off x="5342119" y="3768185"/>
-            <a:ext cx="1507761" cy="1507761"/>
+            <a:off x="4541385" y="3199680"/>
+            <a:ext cx="3109229" cy="3078747"/>
           </a:xfrm>
           <a:prstGeom prst="rect">
             <a:avLst/>
           </a:prstGeom>
-          <a:noFill/>
-          <a:extLst>
-            <a:ext uri="{909E8E84-426E-40DD-AFC4-6F175D3DCCD1}">
-              <a14:hiddenFill xmlns:a14="http://schemas.microsoft.com/office/drawing/2010/main">
-                <a:solidFill>
-                  <a:srgbClr val="FFFFFF"/>
-                </a:solidFill>
-              </a14:hiddenFill>
-            </a:ext>
-          </a:extLst>
         </p:spPr>
       </p:pic>
     </p:spTree>
     <p:extLst>
       <p:ext uri="{BB962C8B-B14F-4D97-AF65-F5344CB8AC3E}">
-        <p14:creationId xmlns:p14="http://schemas.microsoft.com/office/powerpoint/2010/main" val="2872145444"/>
+        <p14:creationId xmlns:p14="http://schemas.microsoft.com/office/powerpoint/2010/main" val="1696150498"/>
       </p:ext>
     </p:extLst>
   </p:cSld>
@@ -13813,6 +13827,116 @@
 </p:sld>
 </file>
 
+<file path=ppt/slides/slide30.xml><?xml version="1.0" encoding="utf-8"?>
+<p:sld xmlns:a="http://schemas.openxmlformats.org/drawingml/2006/main" xmlns:r="http://schemas.openxmlformats.org/officeDocument/2006/relationships" xmlns:p="http://schemas.openxmlformats.org/presentationml/2006/main">
+  <p:cSld>
+    <p:spTree>
+      <p:nvGrpSpPr>
+        <p:cNvPr id="1" name=""/>
+        <p:cNvGrpSpPr/>
+        <p:nvPr/>
+      </p:nvGrpSpPr>
+      <p:grpSpPr>
+        <a:xfrm>
+          <a:off x="0" y="0"/>
+          <a:ext cx="0" cy="0"/>
+          <a:chOff x="0" y="0"/>
+          <a:chExt cx="0" cy="0"/>
+        </a:xfrm>
+      </p:grpSpPr>
+      <p:sp>
+        <p:nvSpPr>
+          <p:cNvPr id="6" name="Titel 5">
+            <a:extLst>
+              <a:ext uri="{FF2B5EF4-FFF2-40B4-BE49-F238E27FC236}">
+                <a16:creationId xmlns:a16="http://schemas.microsoft.com/office/drawing/2014/main" id="{215C6C17-3994-268F-CD9B-1F627A31A4B8}"/>
+              </a:ext>
+            </a:extLst>
+          </p:cNvPr>
+          <p:cNvSpPr>
+            <a:spLocks noGrp="1"/>
+          </p:cNvSpPr>
+          <p:nvPr>
+            <p:ph type="ctrTitle"/>
+          </p:nvPr>
+        </p:nvSpPr>
+        <p:spPr>
+          <a:xfrm>
+            <a:off x="2032213" y="370652"/>
+            <a:ext cx="8127574" cy="2736443"/>
+          </a:xfrm>
+        </p:spPr>
+        <p:txBody>
+          <a:bodyPr/>
+          <a:lstStyle/>
+          <a:p>
+            <a:r>
+              <a:rPr lang="de-AT" dirty="0"/>
+              <a:t>Viel Erfolg beim Entwickeln!</a:t>
+            </a:r>
+          </a:p>
+        </p:txBody>
+      </p:sp>
+      <p:pic>
+        <p:nvPicPr>
+          <p:cNvPr id="2050" name="Picture 2" descr="CODERS.BAY | Linz">
+            <a:extLst>
+              <a:ext uri="{FF2B5EF4-FFF2-40B4-BE49-F238E27FC236}">
+                <a16:creationId xmlns:a16="http://schemas.microsoft.com/office/drawing/2014/main" id="{FC92A2D7-CD40-5160-E3FA-7A115A1ECE63}"/>
+              </a:ext>
+            </a:extLst>
+          </p:cNvPr>
+          <p:cNvPicPr>
+            <a:picLocks noChangeAspect="1" noChangeArrowheads="1"/>
+          </p:cNvPicPr>
+          <p:nvPr/>
+        </p:nvPicPr>
+        <p:blipFill>
+          <a:blip r:embed="rId2">
+            <a:extLst>
+              <a:ext uri="{28A0092B-C50C-407E-A947-70E740481C1C}">
+                <a14:useLocalDpi xmlns:a14="http://schemas.microsoft.com/office/drawing/2010/main" val="0"/>
+              </a:ext>
+            </a:extLst>
+          </a:blip>
+          <a:srcRect/>
+          <a:stretch>
+            <a:fillRect/>
+          </a:stretch>
+        </p:blipFill>
+        <p:spPr bwMode="auto">
+          <a:xfrm>
+            <a:off x="5342119" y="3768185"/>
+            <a:ext cx="1507761" cy="1507761"/>
+          </a:xfrm>
+          <a:prstGeom prst="rect">
+            <a:avLst/>
+          </a:prstGeom>
+          <a:noFill/>
+          <a:extLst>
+            <a:ext uri="{909E8E84-426E-40DD-AFC4-6F175D3DCCD1}">
+              <a14:hiddenFill xmlns:a14="http://schemas.microsoft.com/office/drawing/2010/main">
+                <a:solidFill>
+                  <a:srgbClr val="FFFFFF"/>
+                </a:solidFill>
+              </a14:hiddenFill>
+            </a:ext>
+          </a:extLst>
+        </p:spPr>
+      </p:pic>
+    </p:spTree>
+    <p:extLst>
+      <p:ext uri="{BB962C8B-B14F-4D97-AF65-F5344CB8AC3E}">
+        <p14:creationId xmlns:p14="http://schemas.microsoft.com/office/powerpoint/2010/main" val="2872145444"/>
+      </p:ext>
+    </p:extLst>
+  </p:cSld>
+  <p:clrMapOvr>
+    <a:masterClrMapping/>
+  </p:clrMapOvr>
+</p:sld>
+</file>
+
 <file path=ppt/slides/slide4.xml><?xml version="1.0" encoding="utf-8"?>
 <p:sld xmlns:a="http://schemas.openxmlformats.org/drawingml/2006/main" xmlns:r="http://schemas.openxmlformats.org/officeDocument/2006/relationships" xmlns:p="http://schemas.openxmlformats.org/presentationml/2006/main">
   <p:cSld>
@@ -13969,6 +14093,13 @@
   <p:clrMapOvr>
     <a:masterClrMapping/>
   </p:clrMapOvr>
+  <p:timing>
+    <p:tnLst>
+      <p:par>
+        <p:cTn id="1" dur="indefinite" restart="never" nodeType="tmRoot"/>
+      </p:par>
+    </p:tnLst>
+  </p:timing>
 </p:sld>
 </file>
 
@@ -14101,6 +14232,13 @@
   <p:clrMapOvr>
     <a:masterClrMapping/>
   </p:clrMapOvr>
+  <p:timing>
+    <p:tnLst>
+      <p:par>
+        <p:cTn id="1" dur="indefinite" restart="never" nodeType="tmRoot"/>
+      </p:par>
+    </p:tnLst>
+  </p:timing>
 </p:sld>
 </file>
 

</xml_diff>